<commit_message>
Add slides end plus change things in the README.md
</commit_message>
<xml_diff>
--- a/Presentation/ProjetSTM32.pptx
+++ b/Presentation/ProjetSTM32.pptx
@@ -4,11 +4,15 @@
   <p:sldMasterIdLst>
     <p:sldMasterId id="2147483693" r:id="rId1"/>
   </p:sldMasterIdLst>
+  <p:notesMasterIdLst>
+    <p:notesMasterId r:id="rId7"/>
+  </p:notesMasterIdLst>
   <p:sldIdLst>
     <p:sldId id="256" r:id="rId2"/>
     <p:sldId id="257" r:id="rId3"/>
     <p:sldId id="258" r:id="rId4"/>
     <p:sldId id="259" r:id="rId5"/>
+    <p:sldId id="260" r:id="rId6"/>
   </p:sldIdLst>
   <p:sldSz cx="12192000" cy="6858000"/>
   <p:notesSz cx="6858000" cy="9144000"/>
@@ -115,6 +119,446 @@
 </p:presentation>
 </file>
 
+<file path=ppt/notesMasters/notesMaster1.xml><?xml version="1.0" encoding="utf-8"?>
+<p:notesMaster xmlns:a="http://schemas.openxmlformats.org/drawingml/2006/main" xmlns:r="http://schemas.openxmlformats.org/officeDocument/2006/relationships" xmlns:p="http://schemas.openxmlformats.org/presentationml/2006/main">
+  <p:cSld>
+    <p:bg>
+      <p:bgRef idx="1001">
+        <a:schemeClr val="bg1"/>
+      </p:bgRef>
+    </p:bg>
+    <p:spTree>
+      <p:nvGrpSpPr>
+        <p:cNvPr id="1" name=""/>
+        <p:cNvGrpSpPr/>
+        <p:nvPr/>
+      </p:nvGrpSpPr>
+      <p:grpSpPr>
+        <a:xfrm>
+          <a:off x="0" y="0"/>
+          <a:ext cx="0" cy="0"/>
+          <a:chOff x="0" y="0"/>
+          <a:chExt cx="0" cy="0"/>
+        </a:xfrm>
+      </p:grpSpPr>
+      <p:sp>
+        <p:nvSpPr>
+          <p:cNvPr id="2" name="Espace réservé de l'en-tête 1"/>
+          <p:cNvSpPr>
+            <a:spLocks noGrp="1"/>
+          </p:cNvSpPr>
+          <p:nvPr>
+            <p:ph type="hdr" sz="quarter"/>
+          </p:nvPr>
+        </p:nvSpPr>
+        <p:spPr>
+          <a:xfrm>
+            <a:off x="0" y="0"/>
+            <a:ext cx="2971800" cy="458788"/>
+          </a:xfrm>
+          <a:prstGeom prst="rect">
+            <a:avLst/>
+          </a:prstGeom>
+        </p:spPr>
+        <p:txBody>
+          <a:bodyPr vert="horz" lIns="91440" tIns="45720" rIns="91440" bIns="45720" rtlCol="0"/>
+          <a:lstStyle>
+            <a:lvl1pPr algn="l">
+              <a:defRPr sz="1200"/>
+            </a:lvl1pPr>
+          </a:lstStyle>
+          <a:p>
+            <a:endParaRPr lang="fr-FR" dirty="0"/>
+          </a:p>
+        </p:txBody>
+      </p:sp>
+      <p:sp>
+        <p:nvSpPr>
+          <p:cNvPr id="3" name="Espace réservé de la date 2"/>
+          <p:cNvSpPr>
+            <a:spLocks noGrp="1"/>
+          </p:cNvSpPr>
+          <p:nvPr>
+            <p:ph type="dt" idx="1"/>
+          </p:nvPr>
+        </p:nvSpPr>
+        <p:spPr>
+          <a:xfrm>
+            <a:off x="3884613" y="0"/>
+            <a:ext cx="2971800" cy="458788"/>
+          </a:xfrm>
+          <a:prstGeom prst="rect">
+            <a:avLst/>
+          </a:prstGeom>
+        </p:spPr>
+        <p:txBody>
+          <a:bodyPr vert="horz" lIns="91440" tIns="45720" rIns="91440" bIns="45720" rtlCol="0"/>
+          <a:lstStyle>
+            <a:lvl1pPr algn="r">
+              <a:defRPr sz="1200"/>
+            </a:lvl1pPr>
+          </a:lstStyle>
+          <a:p>
+            <a:fld id="{7670425F-BB30-41C3-A714-35FA039FA646}" type="datetimeFigureOut">
+              <a:rPr lang="fr-FR" smtClean="0"/>
+              <a:t>07/12/2019</a:t>
+            </a:fld>
+            <a:endParaRPr lang="fr-FR" dirty="0"/>
+          </a:p>
+        </p:txBody>
+      </p:sp>
+      <p:sp>
+        <p:nvSpPr>
+          <p:cNvPr id="4" name="Espace réservé de l'image des diapositives 3"/>
+          <p:cNvSpPr>
+            <a:spLocks noGrp="1" noRot="1" noChangeAspect="1"/>
+          </p:cNvSpPr>
+          <p:nvPr>
+            <p:ph type="sldImg" idx="2"/>
+          </p:nvPr>
+        </p:nvSpPr>
+        <p:spPr>
+          <a:xfrm>
+            <a:off x="685800" y="1143000"/>
+            <a:ext cx="5486400" cy="3086100"/>
+          </a:xfrm>
+          <a:prstGeom prst="rect">
+            <a:avLst/>
+          </a:prstGeom>
+          <a:noFill/>
+          <a:ln w="12700">
+            <a:solidFill>
+              <a:prstClr val="black"/>
+            </a:solidFill>
+          </a:ln>
+        </p:spPr>
+        <p:txBody>
+          <a:bodyPr vert="horz" lIns="91440" tIns="45720" rIns="91440" bIns="45720" rtlCol="0" anchor="ctr"/>
+          <a:lstStyle/>
+          <a:p>
+            <a:endParaRPr lang="fr-FR" dirty="0"/>
+          </a:p>
+        </p:txBody>
+      </p:sp>
+      <p:sp>
+        <p:nvSpPr>
+          <p:cNvPr id="5" name="Espace réservé des notes 4"/>
+          <p:cNvSpPr>
+            <a:spLocks noGrp="1"/>
+          </p:cNvSpPr>
+          <p:nvPr>
+            <p:ph type="body" sz="quarter" idx="3"/>
+          </p:nvPr>
+        </p:nvSpPr>
+        <p:spPr>
+          <a:xfrm>
+            <a:off x="685800" y="4400550"/>
+            <a:ext cx="5486400" cy="3600450"/>
+          </a:xfrm>
+          <a:prstGeom prst="rect">
+            <a:avLst/>
+          </a:prstGeom>
+        </p:spPr>
+        <p:txBody>
+          <a:bodyPr vert="horz" lIns="91440" tIns="45720" rIns="91440" bIns="45720" rtlCol="0"/>
+          <a:lstStyle/>
+          <a:p>
+            <a:pPr lvl="0"/>
+            <a:r>
+              <a:rPr lang="fr-FR"/>
+              <a:t>Cliquez pour modifier les styles du texte du masque</a:t>
+            </a:r>
+          </a:p>
+          <a:p>
+            <a:pPr lvl="1"/>
+            <a:r>
+              <a:rPr lang="fr-FR"/>
+              <a:t>Deuxième niveau</a:t>
+            </a:r>
+          </a:p>
+          <a:p>
+            <a:pPr lvl="2"/>
+            <a:r>
+              <a:rPr lang="fr-FR"/>
+              <a:t>Troisième niveau</a:t>
+            </a:r>
+          </a:p>
+          <a:p>
+            <a:pPr lvl="3"/>
+            <a:r>
+              <a:rPr lang="fr-FR"/>
+              <a:t>Quatrième niveau</a:t>
+            </a:r>
+          </a:p>
+          <a:p>
+            <a:pPr lvl="4"/>
+            <a:r>
+              <a:rPr lang="fr-FR"/>
+              <a:t>Cinquième niveau</a:t>
+            </a:r>
+          </a:p>
+        </p:txBody>
+      </p:sp>
+      <p:sp>
+        <p:nvSpPr>
+          <p:cNvPr id="6" name="Espace réservé du pied de page 5"/>
+          <p:cNvSpPr>
+            <a:spLocks noGrp="1"/>
+          </p:cNvSpPr>
+          <p:nvPr>
+            <p:ph type="ftr" sz="quarter" idx="4"/>
+          </p:nvPr>
+        </p:nvSpPr>
+        <p:spPr>
+          <a:xfrm>
+            <a:off x="0" y="8685213"/>
+            <a:ext cx="2971800" cy="458787"/>
+          </a:xfrm>
+          <a:prstGeom prst="rect">
+            <a:avLst/>
+          </a:prstGeom>
+        </p:spPr>
+        <p:txBody>
+          <a:bodyPr vert="horz" lIns="91440" tIns="45720" rIns="91440" bIns="45720" rtlCol="0" anchor="b"/>
+          <a:lstStyle>
+            <a:lvl1pPr algn="l">
+              <a:defRPr sz="1200"/>
+            </a:lvl1pPr>
+          </a:lstStyle>
+          <a:p>
+            <a:endParaRPr lang="fr-FR" dirty="0"/>
+          </a:p>
+        </p:txBody>
+      </p:sp>
+      <p:sp>
+        <p:nvSpPr>
+          <p:cNvPr id="7" name="Espace réservé du numéro de diapositive 6"/>
+          <p:cNvSpPr>
+            <a:spLocks noGrp="1"/>
+          </p:cNvSpPr>
+          <p:nvPr>
+            <p:ph type="sldNum" sz="quarter" idx="5"/>
+          </p:nvPr>
+        </p:nvSpPr>
+        <p:spPr>
+          <a:xfrm>
+            <a:off x="3884613" y="8685213"/>
+            <a:ext cx="2971800" cy="458787"/>
+          </a:xfrm>
+          <a:prstGeom prst="rect">
+            <a:avLst/>
+          </a:prstGeom>
+        </p:spPr>
+        <p:txBody>
+          <a:bodyPr vert="horz" lIns="91440" tIns="45720" rIns="91440" bIns="45720" rtlCol="0" anchor="b"/>
+          <a:lstStyle>
+            <a:lvl1pPr algn="r">
+              <a:defRPr sz="1200"/>
+            </a:lvl1pPr>
+          </a:lstStyle>
+          <a:p>
+            <a:fld id="{969005FE-E1BF-4D50-A5F2-5F8A1A854337}" type="slidenum">
+              <a:rPr lang="fr-FR" smtClean="0"/>
+              <a:t>‹N°›</a:t>
+            </a:fld>
+            <a:endParaRPr lang="fr-FR" dirty="0"/>
+          </a:p>
+        </p:txBody>
+      </p:sp>
+    </p:spTree>
+    <p:extLst>
+      <p:ext uri="{BB962C8B-B14F-4D97-AF65-F5344CB8AC3E}">
+        <p14:creationId xmlns:p14="http://schemas.microsoft.com/office/powerpoint/2010/main" val="2648224212"/>
+      </p:ext>
+    </p:extLst>
+  </p:cSld>
+  <p:clrMap bg1="lt1" tx1="dk1" bg2="lt2" tx2="dk2" accent1="accent1" accent2="accent2" accent3="accent3" accent4="accent4" accent5="accent5" accent6="accent6" hlink="hlink" folHlink="folHlink"/>
+  <p:notesStyle>
+    <a:lvl1pPr marL="0" algn="l" defTabSz="914400" rtl="0" eaLnBrk="1" latinLnBrk="0" hangingPunct="1">
+      <a:defRPr sz="1200" kern="1200">
+        <a:solidFill>
+          <a:schemeClr val="tx1"/>
+        </a:solidFill>
+        <a:latin typeface="+mn-lt"/>
+        <a:ea typeface="+mn-ea"/>
+        <a:cs typeface="+mn-cs"/>
+      </a:defRPr>
+    </a:lvl1pPr>
+    <a:lvl2pPr marL="457200" algn="l" defTabSz="914400" rtl="0" eaLnBrk="1" latinLnBrk="0" hangingPunct="1">
+      <a:defRPr sz="1200" kern="1200">
+        <a:solidFill>
+          <a:schemeClr val="tx1"/>
+        </a:solidFill>
+        <a:latin typeface="+mn-lt"/>
+        <a:ea typeface="+mn-ea"/>
+        <a:cs typeface="+mn-cs"/>
+      </a:defRPr>
+    </a:lvl2pPr>
+    <a:lvl3pPr marL="914400" algn="l" defTabSz="914400" rtl="0" eaLnBrk="1" latinLnBrk="0" hangingPunct="1">
+      <a:defRPr sz="1200" kern="1200">
+        <a:solidFill>
+          <a:schemeClr val="tx1"/>
+        </a:solidFill>
+        <a:latin typeface="+mn-lt"/>
+        <a:ea typeface="+mn-ea"/>
+        <a:cs typeface="+mn-cs"/>
+      </a:defRPr>
+    </a:lvl3pPr>
+    <a:lvl4pPr marL="1371600" algn="l" defTabSz="914400" rtl="0" eaLnBrk="1" latinLnBrk="0" hangingPunct="1">
+      <a:defRPr sz="1200" kern="1200">
+        <a:solidFill>
+          <a:schemeClr val="tx1"/>
+        </a:solidFill>
+        <a:latin typeface="+mn-lt"/>
+        <a:ea typeface="+mn-ea"/>
+        <a:cs typeface="+mn-cs"/>
+      </a:defRPr>
+    </a:lvl4pPr>
+    <a:lvl5pPr marL="1828800" algn="l" defTabSz="914400" rtl="0" eaLnBrk="1" latinLnBrk="0" hangingPunct="1">
+      <a:defRPr sz="1200" kern="1200">
+        <a:solidFill>
+          <a:schemeClr val="tx1"/>
+        </a:solidFill>
+        <a:latin typeface="+mn-lt"/>
+        <a:ea typeface="+mn-ea"/>
+        <a:cs typeface="+mn-cs"/>
+      </a:defRPr>
+    </a:lvl5pPr>
+    <a:lvl6pPr marL="2286000" algn="l" defTabSz="914400" rtl="0" eaLnBrk="1" latinLnBrk="0" hangingPunct="1">
+      <a:defRPr sz="1200" kern="1200">
+        <a:solidFill>
+          <a:schemeClr val="tx1"/>
+        </a:solidFill>
+        <a:latin typeface="+mn-lt"/>
+        <a:ea typeface="+mn-ea"/>
+        <a:cs typeface="+mn-cs"/>
+      </a:defRPr>
+    </a:lvl6pPr>
+    <a:lvl7pPr marL="2743200" algn="l" defTabSz="914400" rtl="0" eaLnBrk="1" latinLnBrk="0" hangingPunct="1">
+      <a:defRPr sz="1200" kern="1200">
+        <a:solidFill>
+          <a:schemeClr val="tx1"/>
+        </a:solidFill>
+        <a:latin typeface="+mn-lt"/>
+        <a:ea typeface="+mn-ea"/>
+        <a:cs typeface="+mn-cs"/>
+      </a:defRPr>
+    </a:lvl7pPr>
+    <a:lvl8pPr marL="3200400" algn="l" defTabSz="914400" rtl="0" eaLnBrk="1" latinLnBrk="0" hangingPunct="1">
+      <a:defRPr sz="1200" kern="1200">
+        <a:solidFill>
+          <a:schemeClr val="tx1"/>
+        </a:solidFill>
+        <a:latin typeface="+mn-lt"/>
+        <a:ea typeface="+mn-ea"/>
+        <a:cs typeface="+mn-cs"/>
+      </a:defRPr>
+    </a:lvl8pPr>
+    <a:lvl9pPr marL="3657600" algn="l" defTabSz="914400" rtl="0" eaLnBrk="1" latinLnBrk="0" hangingPunct="1">
+      <a:defRPr sz="1200" kern="1200">
+        <a:solidFill>
+          <a:schemeClr val="tx1"/>
+        </a:solidFill>
+        <a:latin typeface="+mn-lt"/>
+        <a:ea typeface="+mn-ea"/>
+        <a:cs typeface="+mn-cs"/>
+      </a:defRPr>
+    </a:lvl9pPr>
+  </p:notesStyle>
+</p:notesMaster>
+</file>
+
+<file path=ppt/notesSlides/notesSlide1.xml><?xml version="1.0" encoding="utf-8"?>
+<p:notes xmlns:a="http://schemas.openxmlformats.org/drawingml/2006/main" xmlns:r="http://schemas.openxmlformats.org/officeDocument/2006/relationships" xmlns:p="http://schemas.openxmlformats.org/presentationml/2006/main">
+  <p:cSld>
+    <p:spTree>
+      <p:nvGrpSpPr>
+        <p:cNvPr id="1" name=""/>
+        <p:cNvGrpSpPr/>
+        <p:nvPr/>
+      </p:nvGrpSpPr>
+      <p:grpSpPr>
+        <a:xfrm>
+          <a:off x="0" y="0"/>
+          <a:ext cx="0" cy="0"/>
+          <a:chOff x="0" y="0"/>
+          <a:chExt cx="0" cy="0"/>
+        </a:xfrm>
+      </p:grpSpPr>
+      <p:sp>
+        <p:nvSpPr>
+          <p:cNvPr id="2" name="Espace réservé de l'image des diapositives 1"/>
+          <p:cNvSpPr>
+            <a:spLocks noGrp="1" noRot="1" noChangeAspect="1"/>
+          </p:cNvSpPr>
+          <p:nvPr>
+            <p:ph type="sldImg"/>
+          </p:nvPr>
+        </p:nvSpPr>
+        <p:spPr/>
+      </p:sp>
+      <p:sp>
+        <p:nvSpPr>
+          <p:cNvPr id="3" name="Espace réservé des notes 2"/>
+          <p:cNvSpPr>
+            <a:spLocks noGrp="1"/>
+          </p:cNvSpPr>
+          <p:nvPr>
+            <p:ph type="body" idx="1"/>
+          </p:nvPr>
+        </p:nvSpPr>
+        <p:spPr/>
+        <p:txBody>
+          <a:bodyPr/>
+          <a:lstStyle/>
+          <a:p>
+            <a:pPr marL="228600" indent="-228600">
+              <a:buFont typeface="+mj-lt"/>
+              <a:buAutoNum type="arabicPeriod"/>
+            </a:pPr>
+            <a:r>
+              <a:rPr lang="fr-FR" dirty="0"/>
+              <a:t>Flèche marron (affiche la vitesse du moteur qu’on a configuré)</a:t>
+            </a:r>
+          </a:p>
+        </p:txBody>
+      </p:sp>
+      <p:sp>
+        <p:nvSpPr>
+          <p:cNvPr id="4" name="Espace réservé du numéro de diapositive 3"/>
+          <p:cNvSpPr>
+            <a:spLocks noGrp="1"/>
+          </p:cNvSpPr>
+          <p:nvPr>
+            <p:ph type="sldNum" sz="quarter" idx="5"/>
+          </p:nvPr>
+        </p:nvSpPr>
+        <p:spPr/>
+        <p:txBody>
+          <a:bodyPr/>
+          <a:lstStyle/>
+          <a:p>
+            <a:fld id="{969005FE-E1BF-4D50-A5F2-5F8A1A854337}" type="slidenum">
+              <a:rPr lang="fr-FR" smtClean="0"/>
+              <a:t>4</a:t>
+            </a:fld>
+            <a:endParaRPr lang="fr-FR" dirty="0"/>
+          </a:p>
+        </p:txBody>
+      </p:sp>
+    </p:spTree>
+    <p:extLst>
+      <p:ext uri="{BB962C8B-B14F-4D97-AF65-F5344CB8AC3E}">
+        <p14:creationId xmlns:p14="http://schemas.microsoft.com/office/powerpoint/2010/main" val="2704904904"/>
+      </p:ext>
+    </p:extLst>
+  </p:cSld>
+  <p:clrMapOvr>
+    <a:masterClrMapping/>
+  </p:clrMapOvr>
+</p:notes>
+</file>
+
 <file path=ppt/slideLayouts/slideLayout1.xml><?xml version="1.0" encoding="utf-8"?>
 <p:sldLayout xmlns:a="http://schemas.openxmlformats.org/drawingml/2006/main" xmlns:r="http://schemas.openxmlformats.org/officeDocument/2006/relationships" xmlns:p="http://schemas.openxmlformats.org/presentationml/2006/main" type="title" preserve="1">
   <p:cSld name="Diapositive de titre">
@@ -210,7 +654,7 @@
           <a:effectLst/>
           <a:extLst>
             <a:ext uri="{91240B29-F687-4f45-9708-019B960494DF}">
-              <a14:hiddenLine xmlns:a14="http://schemas.microsoft.com/office/drawing/2010/main" xmlns="" w="9525">
+              <a14:hiddenLine xmlns="" xmlns:a14="http://schemas.microsoft.com/office/drawing/2010/main" w="9525">
                 <a:solidFill>
                   <a:srgbClr val="000000"/>
                 </a:solidFill>
@@ -629,7 +1073,7 @@
           </a:lstStyle>
           <a:p>
             <a:r>
-              <a:rPr lang="fr-FR"/>
+              <a:rPr lang="fr-FR" dirty="0"/>
               <a:t>Cliquez sur l'icône pour ajouter une image</a:t>
             </a:r>
             <a:endParaRPr lang="en-US" dirty="0"/>
@@ -1738,7 +2182,7 @@
           <a:ln/>
           <a:extLst>
             <a:ext uri="{91240B29-F687-4f45-9708-019B960494DF}">
-              <a14:hiddenLine xmlns:a14="http://schemas.microsoft.com/office/drawing/2010/main" xmlns="" w="9525">
+              <a14:hiddenLine xmlns="" xmlns:a14="http://schemas.microsoft.com/office/drawing/2010/main" w="9525">
                 <a:solidFill>
                   <a:srgbClr val="000000"/>
                 </a:solidFill>
@@ -2013,7 +2457,7 @@
           <a:ln/>
           <a:extLst>
             <a:ext uri="{91240B29-F687-4f45-9708-019B960494DF}">
-              <a14:hiddenLine xmlns:a14="http://schemas.microsoft.com/office/drawing/2010/main" xmlns="" w="9525">
+              <a14:hiddenLine xmlns="" xmlns:a14="http://schemas.microsoft.com/office/drawing/2010/main" w="9525">
                 <a:solidFill>
                   <a:srgbClr val="000000"/>
                 </a:solidFill>
@@ -2296,7 +2740,7 @@
           <a:ln/>
           <a:extLst>
             <a:ext uri="{91240B29-F687-4f45-9708-019B960494DF}">
-              <a14:hiddenLine xmlns:a14="http://schemas.microsoft.com/office/drawing/2010/main" xmlns="" w="9525">
+              <a14:hiddenLine xmlns="" xmlns:a14="http://schemas.microsoft.com/office/drawing/2010/main" w="9525">
                 <a:solidFill>
                   <a:srgbClr val="000000"/>
                 </a:solidFill>
@@ -2922,7 +3366,7 @@
           <a:ln/>
           <a:extLst>
             <a:ext uri="{91240B29-F687-4f45-9708-019B960494DF}">
-              <a14:hiddenLine xmlns:a14="http://schemas.microsoft.com/office/drawing/2010/main" xmlns="" w="9525">
+              <a14:hiddenLine xmlns="" xmlns:a14="http://schemas.microsoft.com/office/drawing/2010/main" w="9525">
                 <a:solidFill>
                   <a:srgbClr val="000000"/>
                 </a:solidFill>
@@ -3261,7 +3705,7 @@
           <a:ln/>
           <a:extLst>
             <a:ext uri="{91240B29-F687-4f45-9708-019B960494DF}">
-              <a14:hiddenLine xmlns:a14="http://schemas.microsoft.com/office/drawing/2010/main" xmlns="" w="9525">
+              <a14:hiddenLine xmlns="" xmlns:a14="http://schemas.microsoft.com/office/drawing/2010/main" w="9525">
                 <a:solidFill>
                   <a:srgbClr val="000000"/>
                 </a:solidFill>
@@ -3738,7 +4182,7 @@
           <a:ln/>
           <a:extLst>
             <a:ext uri="{91240B29-F687-4f45-9708-019B960494DF}">
-              <a14:hiddenLine xmlns:a14="http://schemas.microsoft.com/office/drawing/2010/main" xmlns="" w="9525">
+              <a14:hiddenLine xmlns="" xmlns:a14="http://schemas.microsoft.com/office/drawing/2010/main" w="9525">
                 <a:solidFill>
                   <a:srgbClr val="000000"/>
                 </a:solidFill>
@@ -4167,7 +4611,7 @@
           <a:ln/>
           <a:extLst>
             <a:ext uri="{91240B29-F687-4f45-9708-019B960494DF}">
-              <a14:hiddenLine xmlns:a14="http://schemas.microsoft.com/office/drawing/2010/main" xmlns="" w="9525">
+              <a14:hiddenLine xmlns="" xmlns:a14="http://schemas.microsoft.com/office/drawing/2010/main" w="9525">
                 <a:solidFill>
                   <a:srgbClr val="000000"/>
                 </a:solidFill>
@@ -4583,7 +5027,7 @@
           </a:lstStyle>
           <a:p>
             <a:r>
-              <a:rPr lang="fr-FR"/>
+              <a:rPr lang="fr-FR" dirty="0"/>
               <a:t>Cliquez sur l'icône pour ajouter une image</a:t>
             </a:r>
             <a:endParaRPr lang="en-US" dirty="0"/>
@@ -5579,13 +6023,13 @@
           <a:p>
             <a:r>
               <a:rPr lang="fr-FR" dirty="0"/>
-              <a:t>Les résultats pourrons être communiqué par UART vers le PC pour le retour d’information.</a:t>
+              <a:t>Les résultats pourrons être communiqué par USART vers le PC pour le retour d’information.</a:t>
             </a:r>
           </a:p>
           <a:p>
             <a:r>
               <a:rPr lang="fr-FR" dirty="0"/>
-              <a:t>Un bouton URGENCE forcera le démarrage du moteur.</a:t>
+              <a:t>Un bouton URGENCE forcera le démarrage du moteur en vitesse max. </a:t>
             </a:r>
           </a:p>
           <a:p>
@@ -5691,36 +6135,20 @@
           <a:p>
             <a:r>
               <a:rPr lang="fr-FR" dirty="0"/>
-              <a:t>1 </a:t>
-            </a:r>
-            <a:r>
-              <a:rPr lang="fr-FR" dirty="0" err="1"/>
-              <a:t>timer</a:t>
-            </a:r>
+              <a:t>1 timer avec IT toutes les secondes</a:t>
+            </a:r>
+          </a:p>
+          <a:p>
             <a:r>
               <a:rPr lang="fr-FR" dirty="0"/>
-              <a:t> avec IT toutes les secondes</a:t>
-            </a:r>
-          </a:p>
-          <a:p>
+              <a:t>1 timer avec 2 channels pour la génération de 2 PWM</a:t>
+            </a:r>
+          </a:p>
+          <a:p>
+            <a:pPr lvl="1"/>
             <a:r>
               <a:rPr lang="fr-FR" dirty="0"/>
-              <a:t>1 </a:t>
-            </a:r>
-            <a:r>
-              <a:rPr lang="fr-FR" dirty="0" err="1"/>
-              <a:t>timer</a:t>
-            </a:r>
-            <a:r>
-              <a:rPr lang="fr-FR" dirty="0"/>
-              <a:t> avec 2 channels pour la génération de 2 PWM</a:t>
-            </a:r>
-          </a:p>
-          <a:p>
-            <a:pPr lvl="1"/>
-            <a:r>
-              <a:rPr lang="fr-FR" dirty="0"/>
-              <a:t>PWM pour le buzzer</a:t>
+              <a:t>PWM pour le buzzer </a:t>
             </a:r>
           </a:p>
           <a:p>
@@ -5733,13 +6161,13 @@
           <a:p>
             <a:r>
               <a:rPr lang="fr-FR" dirty="0"/>
-              <a:t>1 USART2</a:t>
+              <a:t>1 USART</a:t>
             </a:r>
           </a:p>
           <a:p>
             <a:r>
               <a:rPr lang="fr-FR" dirty="0"/>
-              <a:t>(6 GPIO IT) + 1 GPIO pour le NSS du SPI </a:t>
+              <a:t>(6 GPIO IT) dont 5 boutons + 1 GPIO pour le NSS du SPI </a:t>
             </a:r>
           </a:p>
         </p:txBody>
@@ -5797,7 +6225,7 @@
           <a:p>
             <a:r>
               <a:rPr lang="fr-FR" dirty="0"/>
-              <a:t>Diagramme des interactions </a:t>
+              <a:t>DIAGRAMME DES INTERACTIONS</a:t>
             </a:r>
           </a:p>
         </p:txBody>
@@ -5816,7 +6244,7 @@
         </p:nvSpPr>
         <p:spPr>
           <a:xfrm>
-            <a:off x="4861249" y="3429000"/>
+            <a:off x="7820307" y="3354388"/>
             <a:ext cx="1520890" cy="1119674"/>
           </a:xfrm>
           <a:prstGeom prst="rect">
@@ -5865,7 +6293,7 @@
         </p:nvSpPr>
         <p:spPr>
           <a:xfrm>
-            <a:off x="1922105" y="3503612"/>
+            <a:off x="387916" y="3450238"/>
             <a:ext cx="1250303" cy="970450"/>
           </a:xfrm>
           <a:prstGeom prst="rect">
@@ -5921,7 +6349,7 @@
         </p:nvSpPr>
         <p:spPr>
           <a:xfrm>
-            <a:off x="1922104" y="4729033"/>
+            <a:off x="754944" y="5440362"/>
             <a:ext cx="1250303" cy="970450"/>
           </a:xfrm>
           <a:prstGeom prst="rect">
@@ -5951,15 +6379,7 @@
             <a:pPr algn="ctr"/>
             <a:r>
               <a:rPr lang="fr-FR" dirty="0"/>
-              <a:t>Afficheur 7 </a:t>
-            </a:r>
-            <a:r>
-              <a:rPr lang="fr-FR" dirty="0" err="1"/>
-              <a:t>seg</a:t>
-            </a:r>
-            <a:r>
-              <a:rPr lang="fr-FR" dirty="0"/>
-              <a:t> 4 digits</a:t>
+              <a:t>Afficheur 7 seg 4 digits</a:t>
             </a:r>
           </a:p>
         </p:txBody>
@@ -5978,7 +6398,7 @@
         </p:nvSpPr>
         <p:spPr>
           <a:xfrm>
-            <a:off x="8465974" y="3578224"/>
+            <a:off x="2698046" y="5440362"/>
             <a:ext cx="1250303" cy="970450"/>
           </a:xfrm>
           <a:prstGeom prst="rect">
@@ -6027,7 +6447,7 @@
         </p:nvSpPr>
         <p:spPr>
           <a:xfrm>
-            <a:off x="8465973" y="4850297"/>
+            <a:off x="10053037" y="3414691"/>
             <a:ext cx="1250303" cy="970450"/>
           </a:xfrm>
           <a:prstGeom prst="rect">
@@ -6076,7 +6496,7 @@
         </p:nvSpPr>
         <p:spPr>
           <a:xfrm>
-            <a:off x="4996542" y="2271938"/>
+            <a:off x="7955600" y="1915356"/>
             <a:ext cx="1250303" cy="970450"/>
           </a:xfrm>
           <a:prstGeom prst="rect">
@@ -6125,8 +6545,8 @@
         </p:nvGrpSpPr>
         <p:grpSpPr>
           <a:xfrm>
-            <a:off x="4371390" y="4754579"/>
-            <a:ext cx="2500606" cy="1889807"/>
+            <a:off x="4843494" y="2969351"/>
+            <a:ext cx="2216962" cy="1675446"/>
             <a:chOff x="5190929" y="4705091"/>
             <a:chExt cx="2500606" cy="1889807"/>
           </a:xfrm>
@@ -6328,10 +6748,1193 @@
           </p:txBody>
         </p:sp>
       </p:grpSp>
+      <p:cxnSp>
+        <p:nvCxnSpPr>
+          <p:cNvPr id="15" name="Connecteur droit avec flèche 14">
+            <a:extLst>
+              <a:ext uri="{FF2B5EF4-FFF2-40B4-BE49-F238E27FC236}">
+                <a16:creationId xmlns:a16="http://schemas.microsoft.com/office/drawing/2014/main" id="{8B29025C-3672-4B6F-9DBE-32E517AEFE53}"/>
+              </a:ext>
+            </a:extLst>
+          </p:cNvPr>
+          <p:cNvCxnSpPr>
+            <a:cxnSpLocks/>
+          </p:cNvCxnSpPr>
+          <p:nvPr/>
+        </p:nvCxnSpPr>
+        <p:spPr>
+          <a:xfrm>
+            <a:off x="7060455" y="3627986"/>
+            <a:ext cx="759852" cy="0"/>
+          </a:xfrm>
+          <a:prstGeom prst="straightConnector1">
+            <a:avLst/>
+          </a:prstGeom>
+          <a:ln w="50800">
+            <a:tailEnd type="triangle"/>
+          </a:ln>
+        </p:spPr>
+        <p:style>
+          <a:lnRef idx="3">
+            <a:schemeClr val="accent6"/>
+          </a:lnRef>
+          <a:fillRef idx="0">
+            <a:schemeClr val="accent6"/>
+          </a:fillRef>
+          <a:effectRef idx="2">
+            <a:schemeClr val="accent6"/>
+          </a:effectRef>
+          <a:fontRef idx="minor">
+            <a:schemeClr val="tx1"/>
+          </a:fontRef>
+        </p:style>
+      </p:cxnSp>
+      <p:cxnSp>
+        <p:nvCxnSpPr>
+          <p:cNvPr id="16" name="Connecteur droit avec flèche 15">
+            <a:extLst>
+              <a:ext uri="{FF2B5EF4-FFF2-40B4-BE49-F238E27FC236}">
+                <a16:creationId xmlns:a16="http://schemas.microsoft.com/office/drawing/2014/main" id="{EB6B6D5C-6667-4454-93CB-55DE803D1210}"/>
+              </a:ext>
+            </a:extLst>
+          </p:cNvPr>
+          <p:cNvCxnSpPr>
+            <a:cxnSpLocks/>
+            <a:stCxn id="10" idx="3"/>
+          </p:cNvCxnSpPr>
+          <p:nvPr/>
+        </p:nvCxnSpPr>
+        <p:spPr>
+          <a:xfrm>
+            <a:off x="7060455" y="4214611"/>
+            <a:ext cx="759851" cy="0"/>
+          </a:xfrm>
+          <a:prstGeom prst="straightConnector1">
+            <a:avLst/>
+          </a:prstGeom>
+          <a:ln w="50800">
+            <a:tailEnd type="triangle"/>
+          </a:ln>
+        </p:spPr>
+        <p:style>
+          <a:lnRef idx="3">
+            <a:schemeClr val="accent6"/>
+          </a:lnRef>
+          <a:fillRef idx="0">
+            <a:schemeClr val="accent6"/>
+          </a:fillRef>
+          <a:effectRef idx="2">
+            <a:schemeClr val="accent6"/>
+          </a:effectRef>
+          <a:fontRef idx="minor">
+            <a:schemeClr val="tx1"/>
+          </a:fontRef>
+        </p:style>
+      </p:cxnSp>
+      <p:sp>
+        <p:nvSpPr>
+          <p:cNvPr id="17" name="Rectangle 16">
+            <a:extLst>
+              <a:ext uri="{FF2B5EF4-FFF2-40B4-BE49-F238E27FC236}">
+                <a16:creationId xmlns:a16="http://schemas.microsoft.com/office/drawing/2014/main" id="{F287F04D-B4CB-4CC7-A8F3-3A78524D5BC6}"/>
+              </a:ext>
+            </a:extLst>
+          </p:cNvPr>
+          <p:cNvSpPr/>
+          <p:nvPr/>
+        </p:nvSpPr>
+        <p:spPr>
+          <a:xfrm>
+            <a:off x="2562753" y="3375626"/>
+            <a:ext cx="1520890" cy="1119674"/>
+          </a:xfrm>
+          <a:prstGeom prst="rect">
+            <a:avLst/>
+          </a:prstGeom>
+        </p:spPr>
+        <p:style>
+          <a:lnRef idx="2">
+            <a:schemeClr val="accent3">
+              <a:shade val="50000"/>
+            </a:schemeClr>
+          </a:lnRef>
+          <a:fillRef idx="1">
+            <a:schemeClr val="accent3"/>
+          </a:fillRef>
+          <a:effectRef idx="0">
+            <a:schemeClr val="accent3"/>
+          </a:effectRef>
+          <a:fontRef idx="minor">
+            <a:schemeClr val="lt1"/>
+          </a:fontRef>
+        </p:style>
+        <p:txBody>
+          <a:bodyPr rtlCol="0" anchor="ctr"/>
+          <a:lstStyle/>
+          <a:p>
+            <a:pPr algn="ctr"/>
+            <a:r>
+              <a:rPr lang="fr-FR" sz="2800" dirty="0"/>
+              <a:t>MCU</a:t>
+            </a:r>
+          </a:p>
+          <a:p>
+            <a:pPr algn="ctr"/>
+            <a:r>
+              <a:rPr lang="fr-FR" sz="2800" dirty="0"/>
+              <a:t>(BIS)</a:t>
+            </a:r>
+          </a:p>
+        </p:txBody>
+      </p:sp>
+      <p:cxnSp>
+        <p:nvCxnSpPr>
+          <p:cNvPr id="18" name="Connecteur droit avec flèche 17">
+            <a:extLst>
+              <a:ext uri="{FF2B5EF4-FFF2-40B4-BE49-F238E27FC236}">
+                <a16:creationId xmlns:a16="http://schemas.microsoft.com/office/drawing/2014/main" id="{D6BB2D54-381D-47C3-8CB5-4BA2F4BBB6BF}"/>
+              </a:ext>
+            </a:extLst>
+          </p:cNvPr>
+          <p:cNvCxnSpPr>
+            <a:cxnSpLocks/>
+          </p:cNvCxnSpPr>
+          <p:nvPr/>
+        </p:nvCxnSpPr>
+        <p:spPr>
+          <a:xfrm>
+            <a:off x="9377212" y="3472803"/>
+            <a:ext cx="675825" cy="0"/>
+          </a:xfrm>
+          <a:prstGeom prst="straightConnector1">
+            <a:avLst/>
+          </a:prstGeom>
+          <a:ln w="50800">
+            <a:tailEnd type="triangle"/>
+          </a:ln>
+        </p:spPr>
+        <p:style>
+          <a:lnRef idx="3">
+            <a:schemeClr val="accent6"/>
+          </a:lnRef>
+          <a:fillRef idx="0">
+            <a:schemeClr val="accent6"/>
+          </a:fillRef>
+          <a:effectRef idx="2">
+            <a:schemeClr val="accent6"/>
+          </a:effectRef>
+          <a:fontRef idx="minor">
+            <a:schemeClr val="tx1"/>
+          </a:fontRef>
+        </p:style>
+      </p:cxnSp>
+      <p:cxnSp>
+        <p:nvCxnSpPr>
+          <p:cNvPr id="21" name="Connecteur droit avec flèche 20">
+            <a:extLst>
+              <a:ext uri="{FF2B5EF4-FFF2-40B4-BE49-F238E27FC236}">
+                <a16:creationId xmlns:a16="http://schemas.microsoft.com/office/drawing/2014/main" id="{807EBA76-3341-4CA2-88EC-78C063DC83D2}"/>
+              </a:ext>
+            </a:extLst>
+          </p:cNvPr>
+          <p:cNvCxnSpPr>
+            <a:cxnSpLocks/>
+          </p:cNvCxnSpPr>
+          <p:nvPr/>
+        </p:nvCxnSpPr>
+        <p:spPr>
+          <a:xfrm>
+            <a:off x="9377212" y="3846424"/>
+            <a:ext cx="675825" cy="0"/>
+          </a:xfrm>
+          <a:prstGeom prst="straightConnector1">
+            <a:avLst/>
+          </a:prstGeom>
+          <a:ln w="50800">
+            <a:tailEnd type="triangle"/>
+          </a:ln>
+        </p:spPr>
+        <p:style>
+          <a:lnRef idx="3">
+            <a:schemeClr val="accent6"/>
+          </a:lnRef>
+          <a:fillRef idx="0">
+            <a:schemeClr val="accent6"/>
+          </a:fillRef>
+          <a:effectRef idx="2">
+            <a:schemeClr val="accent6"/>
+          </a:effectRef>
+          <a:fontRef idx="minor">
+            <a:schemeClr val="tx1"/>
+          </a:fontRef>
+        </p:style>
+      </p:cxnSp>
+      <p:cxnSp>
+        <p:nvCxnSpPr>
+          <p:cNvPr id="22" name="Connecteur droit avec flèche 21">
+            <a:extLst>
+              <a:ext uri="{FF2B5EF4-FFF2-40B4-BE49-F238E27FC236}">
+                <a16:creationId xmlns:a16="http://schemas.microsoft.com/office/drawing/2014/main" id="{E13384E4-49E5-45D5-B35D-28BBADE991FF}"/>
+              </a:ext>
+            </a:extLst>
+          </p:cNvPr>
+          <p:cNvCxnSpPr>
+            <a:cxnSpLocks/>
+          </p:cNvCxnSpPr>
+          <p:nvPr/>
+        </p:nvCxnSpPr>
+        <p:spPr>
+          <a:xfrm flipH="1" flipV="1">
+            <a:off x="4070449" y="3653993"/>
+            <a:ext cx="773045" cy="4594"/>
+          </a:xfrm>
+          <a:prstGeom prst="straightConnector1">
+            <a:avLst/>
+          </a:prstGeom>
+          <a:ln w="50800">
+            <a:solidFill>
+              <a:schemeClr val="accent3"/>
+            </a:solidFill>
+            <a:tailEnd type="triangle"/>
+          </a:ln>
+        </p:spPr>
+        <p:style>
+          <a:lnRef idx="3">
+            <a:schemeClr val="accent6"/>
+          </a:lnRef>
+          <a:fillRef idx="0">
+            <a:schemeClr val="accent6"/>
+          </a:fillRef>
+          <a:effectRef idx="2">
+            <a:schemeClr val="accent6"/>
+          </a:effectRef>
+          <a:fontRef idx="minor">
+            <a:schemeClr val="tx1"/>
+          </a:fontRef>
+        </p:style>
+      </p:cxnSp>
+      <p:cxnSp>
+        <p:nvCxnSpPr>
+          <p:cNvPr id="25" name="Connecteur droit avec flèche 24">
+            <a:extLst>
+              <a:ext uri="{FF2B5EF4-FFF2-40B4-BE49-F238E27FC236}">
+                <a16:creationId xmlns:a16="http://schemas.microsoft.com/office/drawing/2014/main" id="{F168EB9D-452C-431A-9670-4BD6178E8AF5}"/>
+              </a:ext>
+            </a:extLst>
+          </p:cNvPr>
+          <p:cNvCxnSpPr>
+            <a:cxnSpLocks/>
+            <a:stCxn id="11" idx="1"/>
+          </p:cNvCxnSpPr>
+          <p:nvPr/>
+        </p:nvCxnSpPr>
+        <p:spPr>
+          <a:xfrm flipH="1">
+            <a:off x="4112332" y="4210792"/>
+            <a:ext cx="731162" cy="0"/>
+          </a:xfrm>
+          <a:prstGeom prst="straightConnector1">
+            <a:avLst/>
+          </a:prstGeom>
+          <a:ln w="50800">
+            <a:solidFill>
+              <a:schemeClr val="accent3"/>
+            </a:solidFill>
+            <a:tailEnd type="triangle"/>
+          </a:ln>
+        </p:spPr>
+        <p:style>
+          <a:lnRef idx="3">
+            <a:schemeClr val="accent6"/>
+          </a:lnRef>
+          <a:fillRef idx="0">
+            <a:schemeClr val="accent6"/>
+          </a:fillRef>
+          <a:effectRef idx="2">
+            <a:schemeClr val="accent6"/>
+          </a:effectRef>
+          <a:fontRef idx="minor">
+            <a:schemeClr val="tx1"/>
+          </a:fontRef>
+        </p:style>
+      </p:cxnSp>
+      <p:cxnSp>
+        <p:nvCxnSpPr>
+          <p:cNvPr id="30" name="Connecteur droit avec flèche 29">
+            <a:extLst>
+              <a:ext uri="{FF2B5EF4-FFF2-40B4-BE49-F238E27FC236}">
+                <a16:creationId xmlns:a16="http://schemas.microsoft.com/office/drawing/2014/main" id="{938A0F62-5E40-4422-93F6-12BF1C41C6DC}"/>
+              </a:ext>
+            </a:extLst>
+          </p:cNvPr>
+          <p:cNvCxnSpPr>
+            <a:cxnSpLocks/>
+          </p:cNvCxnSpPr>
+          <p:nvPr/>
+        </p:nvCxnSpPr>
+        <p:spPr>
+          <a:xfrm flipH="1">
+            <a:off x="1638219" y="3617123"/>
+            <a:ext cx="895845" cy="0"/>
+          </a:xfrm>
+          <a:prstGeom prst="straightConnector1">
+            <a:avLst/>
+          </a:prstGeom>
+          <a:ln w="50800">
+            <a:solidFill>
+              <a:schemeClr val="accent3"/>
+            </a:solidFill>
+            <a:tailEnd type="triangle"/>
+          </a:ln>
+        </p:spPr>
+        <p:style>
+          <a:lnRef idx="3">
+            <a:schemeClr val="accent6"/>
+          </a:lnRef>
+          <a:fillRef idx="0">
+            <a:schemeClr val="accent6"/>
+          </a:fillRef>
+          <a:effectRef idx="2">
+            <a:schemeClr val="accent6"/>
+          </a:effectRef>
+          <a:fontRef idx="minor">
+            <a:schemeClr val="tx1"/>
+          </a:fontRef>
+        </p:style>
+      </p:cxnSp>
+      <p:cxnSp>
+        <p:nvCxnSpPr>
+          <p:cNvPr id="31" name="Connecteur droit avec flèche 30">
+            <a:extLst>
+              <a:ext uri="{FF2B5EF4-FFF2-40B4-BE49-F238E27FC236}">
+                <a16:creationId xmlns:a16="http://schemas.microsoft.com/office/drawing/2014/main" id="{EF799438-BC66-4626-A8C9-9020169E168E}"/>
+              </a:ext>
+            </a:extLst>
+          </p:cNvPr>
+          <p:cNvCxnSpPr>
+            <a:cxnSpLocks/>
+          </p:cNvCxnSpPr>
+          <p:nvPr/>
+        </p:nvCxnSpPr>
+        <p:spPr>
+          <a:xfrm flipH="1">
+            <a:off x="1638219" y="4220320"/>
+            <a:ext cx="895845" cy="13776"/>
+          </a:xfrm>
+          <a:prstGeom prst="straightConnector1">
+            <a:avLst/>
+          </a:prstGeom>
+          <a:ln w="50800">
+            <a:solidFill>
+              <a:schemeClr val="accent3"/>
+            </a:solidFill>
+            <a:tailEnd type="triangle"/>
+          </a:ln>
+        </p:spPr>
+        <p:style>
+          <a:lnRef idx="3">
+            <a:schemeClr val="accent6"/>
+          </a:lnRef>
+          <a:fillRef idx="0">
+            <a:schemeClr val="accent6"/>
+          </a:fillRef>
+          <a:effectRef idx="2">
+            <a:schemeClr val="accent6"/>
+          </a:effectRef>
+          <a:fontRef idx="minor">
+            <a:schemeClr val="tx1"/>
+          </a:fontRef>
+        </p:style>
+      </p:cxnSp>
+      <p:cxnSp>
+        <p:nvCxnSpPr>
+          <p:cNvPr id="33" name="Connecteur droit avec flèche 32">
+            <a:extLst>
+              <a:ext uri="{FF2B5EF4-FFF2-40B4-BE49-F238E27FC236}">
+                <a16:creationId xmlns:a16="http://schemas.microsoft.com/office/drawing/2014/main" id="{3368B868-6D2D-4405-AA8F-1C152F9356B4}"/>
+              </a:ext>
+            </a:extLst>
+          </p:cNvPr>
+          <p:cNvCxnSpPr>
+            <a:stCxn id="9" idx="2"/>
+            <a:endCxn id="4" idx="0"/>
+          </p:cNvCxnSpPr>
+          <p:nvPr/>
+        </p:nvCxnSpPr>
+        <p:spPr>
+          <a:xfrm>
+            <a:off x="8580752" y="2885806"/>
+            <a:ext cx="0" cy="468582"/>
+          </a:xfrm>
+          <a:prstGeom prst="straightConnector1">
+            <a:avLst/>
+          </a:prstGeom>
+          <a:ln w="50800">
+            <a:tailEnd type="triangle"/>
+          </a:ln>
+        </p:spPr>
+        <p:style>
+          <a:lnRef idx="1">
+            <a:schemeClr val="accent1"/>
+          </a:lnRef>
+          <a:fillRef idx="0">
+            <a:schemeClr val="accent1"/>
+          </a:fillRef>
+          <a:effectRef idx="0">
+            <a:schemeClr val="accent1"/>
+          </a:effectRef>
+          <a:fontRef idx="minor">
+            <a:schemeClr val="tx1"/>
+          </a:fontRef>
+        </p:style>
+      </p:cxnSp>
+      <p:cxnSp>
+        <p:nvCxnSpPr>
+          <p:cNvPr id="34" name="Connecteur droit avec flèche 33">
+            <a:extLst>
+              <a:ext uri="{FF2B5EF4-FFF2-40B4-BE49-F238E27FC236}">
+                <a16:creationId xmlns:a16="http://schemas.microsoft.com/office/drawing/2014/main" id="{52600624-EFFC-4B2C-88FD-D0888FF37C24}"/>
+              </a:ext>
+            </a:extLst>
+          </p:cNvPr>
+          <p:cNvCxnSpPr>
+            <a:cxnSpLocks/>
+          </p:cNvCxnSpPr>
+          <p:nvPr/>
+        </p:nvCxnSpPr>
+        <p:spPr>
+          <a:xfrm flipV="1">
+            <a:off x="9341197" y="3644278"/>
+            <a:ext cx="711840" cy="14309"/>
+          </a:xfrm>
+          <a:prstGeom prst="straightConnector1">
+            <a:avLst/>
+          </a:prstGeom>
+          <a:ln w="50800">
+            <a:tailEnd type="triangle"/>
+          </a:ln>
+        </p:spPr>
+        <p:style>
+          <a:lnRef idx="1">
+            <a:schemeClr val="accent1"/>
+          </a:lnRef>
+          <a:fillRef idx="0">
+            <a:schemeClr val="accent1"/>
+          </a:fillRef>
+          <a:effectRef idx="0">
+            <a:schemeClr val="accent1"/>
+          </a:effectRef>
+          <a:fontRef idx="minor">
+            <a:schemeClr val="tx1"/>
+          </a:fontRef>
+        </p:style>
+      </p:cxnSp>
+      <p:cxnSp>
+        <p:nvCxnSpPr>
+          <p:cNvPr id="42" name="Connecteur droit avec flèche 41">
+            <a:extLst>
+              <a:ext uri="{FF2B5EF4-FFF2-40B4-BE49-F238E27FC236}">
+                <a16:creationId xmlns:a16="http://schemas.microsoft.com/office/drawing/2014/main" id="{72FAC05D-8FE5-4949-B4F4-C5FE92A84230}"/>
+              </a:ext>
+            </a:extLst>
+          </p:cNvPr>
+          <p:cNvCxnSpPr>
+            <a:stCxn id="5" idx="3"/>
+            <a:endCxn id="17" idx="1"/>
+          </p:cNvCxnSpPr>
+          <p:nvPr/>
+        </p:nvCxnSpPr>
+        <p:spPr>
+          <a:xfrm>
+            <a:off x="1638219" y="3935463"/>
+            <a:ext cx="924534" cy="0"/>
+          </a:xfrm>
+          <a:prstGeom prst="straightConnector1">
+            <a:avLst/>
+          </a:prstGeom>
+          <a:ln w="47625">
+            <a:solidFill>
+              <a:srgbClr val="7030A0"/>
+            </a:solidFill>
+            <a:tailEnd type="triangle"/>
+          </a:ln>
+        </p:spPr>
+        <p:style>
+          <a:lnRef idx="1">
+            <a:schemeClr val="accent1"/>
+          </a:lnRef>
+          <a:fillRef idx="0">
+            <a:schemeClr val="accent1"/>
+          </a:fillRef>
+          <a:effectRef idx="0">
+            <a:schemeClr val="accent1"/>
+          </a:effectRef>
+          <a:fontRef idx="minor">
+            <a:schemeClr val="tx1"/>
+          </a:fontRef>
+        </p:style>
+      </p:cxnSp>
+      <p:cxnSp>
+        <p:nvCxnSpPr>
+          <p:cNvPr id="43" name="Connecteur droit avec flèche 42">
+            <a:extLst>
+              <a:ext uri="{FF2B5EF4-FFF2-40B4-BE49-F238E27FC236}">
+                <a16:creationId xmlns:a16="http://schemas.microsoft.com/office/drawing/2014/main" id="{42F4A6BA-8AB1-48A2-A9BA-972918892B55}"/>
+              </a:ext>
+            </a:extLst>
+          </p:cNvPr>
+          <p:cNvCxnSpPr>
+            <a:cxnSpLocks/>
+            <a:stCxn id="17" idx="2"/>
+            <a:endCxn id="6" idx="0"/>
+          </p:cNvCxnSpPr>
+          <p:nvPr/>
+        </p:nvCxnSpPr>
+        <p:spPr>
+          <a:xfrm flipH="1">
+            <a:off x="1380096" y="4495300"/>
+            <a:ext cx="1943102" cy="945062"/>
+          </a:xfrm>
+          <a:prstGeom prst="straightConnector1">
+            <a:avLst/>
+          </a:prstGeom>
+          <a:ln w="47625">
+            <a:solidFill>
+              <a:srgbClr val="7030A0"/>
+            </a:solidFill>
+            <a:tailEnd type="triangle"/>
+          </a:ln>
+        </p:spPr>
+        <p:style>
+          <a:lnRef idx="1">
+            <a:schemeClr val="accent1"/>
+          </a:lnRef>
+          <a:fillRef idx="0">
+            <a:schemeClr val="accent1"/>
+          </a:fillRef>
+          <a:effectRef idx="0">
+            <a:schemeClr val="accent1"/>
+          </a:effectRef>
+          <a:fontRef idx="minor">
+            <a:schemeClr val="tx1"/>
+          </a:fontRef>
+        </p:style>
+      </p:cxnSp>
+      <p:cxnSp>
+        <p:nvCxnSpPr>
+          <p:cNvPr id="45" name="Connecteur droit avec flèche 44">
+            <a:extLst>
+              <a:ext uri="{FF2B5EF4-FFF2-40B4-BE49-F238E27FC236}">
+                <a16:creationId xmlns:a16="http://schemas.microsoft.com/office/drawing/2014/main" id="{59A49195-05AC-4A2A-BE2C-366AC3ECA30F}"/>
+              </a:ext>
+            </a:extLst>
+          </p:cNvPr>
+          <p:cNvCxnSpPr>
+            <a:cxnSpLocks/>
+            <a:stCxn id="17" idx="2"/>
+            <a:endCxn id="7" idx="0"/>
+          </p:cNvCxnSpPr>
+          <p:nvPr/>
+        </p:nvCxnSpPr>
+        <p:spPr>
+          <a:xfrm>
+            <a:off x="3323198" y="4495300"/>
+            <a:ext cx="0" cy="945062"/>
+          </a:xfrm>
+          <a:prstGeom prst="straightConnector1">
+            <a:avLst/>
+          </a:prstGeom>
+          <a:ln w="47625">
+            <a:solidFill>
+              <a:srgbClr val="7030A0"/>
+            </a:solidFill>
+            <a:tailEnd type="triangle"/>
+          </a:ln>
+        </p:spPr>
+        <p:style>
+          <a:lnRef idx="1">
+            <a:schemeClr val="accent1"/>
+          </a:lnRef>
+          <a:fillRef idx="0">
+            <a:schemeClr val="accent1"/>
+          </a:fillRef>
+          <a:effectRef idx="0">
+            <a:schemeClr val="accent1"/>
+          </a:effectRef>
+          <a:fontRef idx="minor">
+            <a:schemeClr val="tx1"/>
+          </a:fontRef>
+        </p:style>
+      </p:cxnSp>
+      <p:sp>
+        <p:nvSpPr>
+          <p:cNvPr id="48" name="Rectangle 47">
+            <a:extLst>
+              <a:ext uri="{FF2B5EF4-FFF2-40B4-BE49-F238E27FC236}">
+                <a16:creationId xmlns:a16="http://schemas.microsoft.com/office/drawing/2014/main" id="{26FCD6E9-B6AE-40F7-93F6-2CC3CD95A2C6}"/>
+              </a:ext>
+            </a:extLst>
+          </p:cNvPr>
+          <p:cNvSpPr/>
+          <p:nvPr/>
+        </p:nvSpPr>
+        <p:spPr>
+          <a:xfrm>
+            <a:off x="2833340" y="1915356"/>
+            <a:ext cx="1250303" cy="970450"/>
+          </a:xfrm>
+          <a:prstGeom prst="rect">
+            <a:avLst/>
+          </a:prstGeom>
+        </p:spPr>
+        <p:style>
+          <a:lnRef idx="2">
+            <a:schemeClr val="accent1">
+              <a:shade val="50000"/>
+            </a:schemeClr>
+          </a:lnRef>
+          <a:fillRef idx="1">
+            <a:schemeClr val="accent1"/>
+          </a:fillRef>
+          <a:effectRef idx="0">
+            <a:schemeClr val="accent1"/>
+          </a:effectRef>
+          <a:fontRef idx="minor">
+            <a:schemeClr val="lt1"/>
+          </a:fontRef>
+        </p:style>
+        <p:txBody>
+          <a:bodyPr rtlCol="0" anchor="ctr"/>
+          <a:lstStyle/>
+          <a:p>
+            <a:pPr algn="ctr"/>
+            <a:r>
+              <a:rPr lang="fr-FR" dirty="0"/>
+              <a:t>Sortie Console</a:t>
+            </a:r>
+          </a:p>
+        </p:txBody>
+      </p:sp>
+      <p:cxnSp>
+        <p:nvCxnSpPr>
+          <p:cNvPr id="50" name="Connecteur droit avec flèche 49">
+            <a:extLst>
+              <a:ext uri="{FF2B5EF4-FFF2-40B4-BE49-F238E27FC236}">
+                <a16:creationId xmlns:a16="http://schemas.microsoft.com/office/drawing/2014/main" id="{05927BBE-EA3A-409F-A2F4-4F913C105E7B}"/>
+              </a:ext>
+            </a:extLst>
+          </p:cNvPr>
+          <p:cNvCxnSpPr>
+            <a:cxnSpLocks/>
+            <a:stCxn id="17" idx="0"/>
+          </p:cNvCxnSpPr>
+          <p:nvPr/>
+        </p:nvCxnSpPr>
+        <p:spPr>
+          <a:xfrm flipV="1">
+            <a:off x="3323198" y="2885806"/>
+            <a:ext cx="0" cy="489820"/>
+          </a:xfrm>
+          <a:prstGeom prst="straightConnector1">
+            <a:avLst/>
+          </a:prstGeom>
+          <a:ln w="47625">
+            <a:solidFill>
+              <a:srgbClr val="7030A0"/>
+            </a:solidFill>
+            <a:tailEnd type="triangle"/>
+          </a:ln>
+        </p:spPr>
+        <p:style>
+          <a:lnRef idx="1">
+            <a:schemeClr val="accent1"/>
+          </a:lnRef>
+          <a:fillRef idx="0">
+            <a:schemeClr val="accent1"/>
+          </a:fillRef>
+          <a:effectRef idx="0">
+            <a:schemeClr val="accent1"/>
+          </a:effectRef>
+          <a:fontRef idx="minor">
+            <a:schemeClr val="tx1"/>
+          </a:fontRef>
+        </p:style>
+      </p:cxnSp>
+      <p:cxnSp>
+        <p:nvCxnSpPr>
+          <p:cNvPr id="54" name="Connecteur droit avec flèche 53">
+            <a:extLst>
+              <a:ext uri="{FF2B5EF4-FFF2-40B4-BE49-F238E27FC236}">
+                <a16:creationId xmlns:a16="http://schemas.microsoft.com/office/drawing/2014/main" id="{620FF2CC-DA45-45FE-8C7D-AFF610E913F0}"/>
+              </a:ext>
+            </a:extLst>
+          </p:cNvPr>
+          <p:cNvCxnSpPr/>
+          <p:nvPr/>
+        </p:nvCxnSpPr>
+        <p:spPr>
+          <a:xfrm flipH="1">
+            <a:off x="9341197" y="4065476"/>
+            <a:ext cx="711840" cy="0"/>
+          </a:xfrm>
+          <a:prstGeom prst="straightConnector1">
+            <a:avLst/>
+          </a:prstGeom>
+          <a:ln w="50800">
+            <a:solidFill>
+              <a:schemeClr val="accent4">
+                <a:lumMod val="50000"/>
+              </a:schemeClr>
+            </a:solidFill>
+            <a:tailEnd type="triangle"/>
+          </a:ln>
+        </p:spPr>
+        <p:style>
+          <a:lnRef idx="1">
+            <a:schemeClr val="accent1"/>
+          </a:lnRef>
+          <a:fillRef idx="0">
+            <a:schemeClr val="accent1"/>
+          </a:fillRef>
+          <a:effectRef idx="0">
+            <a:schemeClr val="accent1"/>
+          </a:effectRef>
+          <a:fontRef idx="minor">
+            <a:schemeClr val="tx1"/>
+          </a:fontRef>
+        </p:style>
+      </p:cxnSp>
+      <p:cxnSp>
+        <p:nvCxnSpPr>
+          <p:cNvPr id="56" name="Connecteur : en angle 55">
+            <a:extLst>
+              <a:ext uri="{FF2B5EF4-FFF2-40B4-BE49-F238E27FC236}">
+                <a16:creationId xmlns:a16="http://schemas.microsoft.com/office/drawing/2014/main" id="{93DE77A9-179F-4EEE-94FB-BC47A1C35C3D}"/>
+              </a:ext>
+            </a:extLst>
+          </p:cNvPr>
+          <p:cNvCxnSpPr>
+            <a:cxnSpLocks/>
+          </p:cNvCxnSpPr>
+          <p:nvPr/>
+        </p:nvCxnSpPr>
+        <p:spPr>
+          <a:xfrm rot="10800000">
+            <a:off x="4068374" y="2245793"/>
+            <a:ext cx="3715919" cy="1165839"/>
+          </a:xfrm>
+          <a:prstGeom prst="bentConnector3">
+            <a:avLst>
+              <a:gd name="adj1" fmla="val 9516"/>
+            </a:avLst>
+          </a:prstGeom>
+          <a:ln w="50800">
+            <a:solidFill>
+              <a:schemeClr val="accent4">
+                <a:lumMod val="50000"/>
+              </a:schemeClr>
+            </a:solidFill>
+            <a:tailEnd type="triangle"/>
+          </a:ln>
+        </p:spPr>
+        <p:style>
+          <a:lnRef idx="1">
+            <a:schemeClr val="accent1"/>
+          </a:lnRef>
+          <a:fillRef idx="0">
+            <a:schemeClr val="accent1"/>
+          </a:fillRef>
+          <a:effectRef idx="0">
+            <a:schemeClr val="accent1"/>
+          </a:effectRef>
+          <a:fontRef idx="minor">
+            <a:schemeClr val="tx1"/>
+          </a:fontRef>
+        </p:style>
+      </p:cxnSp>
+      <p:sp>
+        <p:nvSpPr>
+          <p:cNvPr id="67" name="ZoneTexte 66">
+            <a:extLst>
+              <a:ext uri="{FF2B5EF4-FFF2-40B4-BE49-F238E27FC236}">
+                <a16:creationId xmlns:a16="http://schemas.microsoft.com/office/drawing/2014/main" id="{A50F6FC1-8AE9-40BB-A276-65920B1D4215}"/>
+              </a:ext>
+            </a:extLst>
+          </p:cNvPr>
+          <p:cNvSpPr txBox="1"/>
+          <p:nvPr/>
+        </p:nvSpPr>
+        <p:spPr>
+          <a:xfrm>
+            <a:off x="2247415" y="2935431"/>
+            <a:ext cx="1370003" cy="369332"/>
+          </a:xfrm>
+          <a:prstGeom prst="rect">
+            <a:avLst/>
+          </a:prstGeom>
+          <a:noFill/>
+        </p:spPr>
+        <p:txBody>
+          <a:bodyPr wrap="square" rtlCol="0">
+            <a:spAutoFit/>
+          </a:bodyPr>
+          <a:lstStyle/>
+          <a:p>
+            <a:r>
+              <a:rPr lang="fr-FR" dirty="0"/>
+              <a:t>TIM2 (1s)</a:t>
+            </a:r>
+          </a:p>
+        </p:txBody>
+      </p:sp>
+      <p:sp>
+        <p:nvSpPr>
+          <p:cNvPr id="68" name="ZoneTexte 67">
+            <a:extLst>
+              <a:ext uri="{FF2B5EF4-FFF2-40B4-BE49-F238E27FC236}">
+                <a16:creationId xmlns:a16="http://schemas.microsoft.com/office/drawing/2014/main" id="{3001E668-F437-4925-8895-9160D396F616}"/>
+              </a:ext>
+            </a:extLst>
+          </p:cNvPr>
+          <p:cNvSpPr txBox="1"/>
+          <p:nvPr/>
+        </p:nvSpPr>
+        <p:spPr>
+          <a:xfrm>
+            <a:off x="3880227" y="5586040"/>
+            <a:ext cx="1926534" cy="646331"/>
+          </a:xfrm>
+          <a:prstGeom prst="rect">
+            <a:avLst/>
+          </a:prstGeom>
+          <a:noFill/>
+        </p:spPr>
+        <p:txBody>
+          <a:bodyPr wrap="square" rtlCol="0">
+            <a:spAutoFit/>
+          </a:bodyPr>
+          <a:lstStyle/>
+          <a:p>
+            <a:pPr algn="ctr"/>
+            <a:r>
+              <a:rPr lang="fr-FR" dirty="0"/>
+              <a:t>TIM3 </a:t>
+            </a:r>
+            <a:r>
+              <a:rPr lang="fr-FR" dirty="0" err="1"/>
+              <a:t>channel</a:t>
+            </a:r>
+            <a:r>
+              <a:rPr lang="fr-FR" dirty="0"/>
+              <a:t> 2 (PWM)</a:t>
+            </a:r>
+          </a:p>
+        </p:txBody>
+      </p:sp>
+      <p:sp>
+        <p:nvSpPr>
+          <p:cNvPr id="69" name="ZoneTexte 68">
+            <a:extLst>
+              <a:ext uri="{FF2B5EF4-FFF2-40B4-BE49-F238E27FC236}">
+                <a16:creationId xmlns:a16="http://schemas.microsoft.com/office/drawing/2014/main" id="{E181FFBE-551E-4ADA-B5BA-E3167762567A}"/>
+              </a:ext>
+            </a:extLst>
+          </p:cNvPr>
+          <p:cNvSpPr txBox="1"/>
+          <p:nvPr/>
+        </p:nvSpPr>
+        <p:spPr>
+          <a:xfrm>
+            <a:off x="9468727" y="4495300"/>
+            <a:ext cx="1943098" cy="646331"/>
+          </a:xfrm>
+          <a:prstGeom prst="rect">
+            <a:avLst/>
+          </a:prstGeom>
+          <a:noFill/>
+        </p:spPr>
+        <p:txBody>
+          <a:bodyPr wrap="square" rtlCol="0">
+            <a:spAutoFit/>
+          </a:bodyPr>
+          <a:lstStyle/>
+          <a:p>
+            <a:pPr algn="ctr"/>
+            <a:r>
+              <a:rPr lang="fr-FR" dirty="0"/>
+              <a:t>TIM3 </a:t>
+            </a:r>
+            <a:r>
+              <a:rPr lang="fr-FR" dirty="0" err="1"/>
+              <a:t>channel</a:t>
+            </a:r>
+            <a:r>
+              <a:rPr lang="fr-FR" dirty="0"/>
+              <a:t> 1 (PWM)</a:t>
+            </a:r>
+          </a:p>
+        </p:txBody>
+      </p:sp>
+      <p:sp>
+        <p:nvSpPr>
+          <p:cNvPr id="70" name="ZoneTexte 69">
+            <a:extLst>
+              <a:ext uri="{FF2B5EF4-FFF2-40B4-BE49-F238E27FC236}">
+                <a16:creationId xmlns:a16="http://schemas.microsoft.com/office/drawing/2014/main" id="{E1DE661D-62F7-4E09-BB3B-4362077DC2F4}"/>
+              </a:ext>
+            </a:extLst>
+          </p:cNvPr>
+          <p:cNvSpPr txBox="1"/>
+          <p:nvPr/>
+        </p:nvSpPr>
+        <p:spPr>
+          <a:xfrm>
+            <a:off x="1376448" y="4836150"/>
+            <a:ext cx="532465" cy="369332"/>
+          </a:xfrm>
+          <a:prstGeom prst="rect">
+            <a:avLst/>
+          </a:prstGeom>
+          <a:noFill/>
+        </p:spPr>
+        <p:txBody>
+          <a:bodyPr wrap="square" rtlCol="0">
+            <a:spAutoFit/>
+          </a:bodyPr>
+          <a:lstStyle/>
+          <a:p>
+            <a:r>
+              <a:rPr lang="fr-FR" dirty="0"/>
+              <a:t>SPI</a:t>
+            </a:r>
+          </a:p>
+        </p:txBody>
+      </p:sp>
+      <p:sp>
+        <p:nvSpPr>
+          <p:cNvPr id="74" name="ZoneTexte 73">
+            <a:extLst>
+              <a:ext uri="{FF2B5EF4-FFF2-40B4-BE49-F238E27FC236}">
+                <a16:creationId xmlns:a16="http://schemas.microsoft.com/office/drawing/2014/main" id="{AE700D34-0C18-41FD-B558-BF655B980168}"/>
+              </a:ext>
+            </a:extLst>
+          </p:cNvPr>
+          <p:cNvSpPr txBox="1"/>
+          <p:nvPr/>
+        </p:nvSpPr>
+        <p:spPr>
+          <a:xfrm>
+            <a:off x="1436043" y="3135970"/>
+            <a:ext cx="633439" cy="369332"/>
+          </a:xfrm>
+          <a:prstGeom prst="rect">
+            <a:avLst/>
+          </a:prstGeom>
+          <a:noFill/>
+        </p:spPr>
+        <p:txBody>
+          <a:bodyPr wrap="square" rtlCol="0">
+            <a:spAutoFit/>
+          </a:bodyPr>
+          <a:lstStyle/>
+          <a:p>
+            <a:r>
+              <a:rPr lang="fr-FR" dirty="0"/>
+              <a:t>I2C</a:t>
+            </a:r>
+          </a:p>
+        </p:txBody>
+      </p:sp>
+      <p:sp>
+        <p:nvSpPr>
+          <p:cNvPr id="78" name="ZoneTexte 77">
+            <a:extLst>
+              <a:ext uri="{FF2B5EF4-FFF2-40B4-BE49-F238E27FC236}">
+                <a16:creationId xmlns:a16="http://schemas.microsoft.com/office/drawing/2014/main" id="{BA72CEAE-C3C1-4711-B75E-93B58B6A1302}"/>
+              </a:ext>
+            </a:extLst>
+          </p:cNvPr>
+          <p:cNvSpPr txBox="1"/>
+          <p:nvPr/>
+        </p:nvSpPr>
+        <p:spPr>
+          <a:xfrm>
+            <a:off x="7208088" y="4616318"/>
+            <a:ext cx="1943098" cy="369332"/>
+          </a:xfrm>
+          <a:prstGeom prst="rect">
+            <a:avLst/>
+          </a:prstGeom>
+          <a:noFill/>
+        </p:spPr>
+        <p:txBody>
+          <a:bodyPr wrap="square" rtlCol="0">
+            <a:spAutoFit/>
+          </a:bodyPr>
+          <a:lstStyle/>
+          <a:p>
+            <a:r>
+              <a:rPr lang="fr-FR" dirty="0"/>
+              <a:t>GPIOs EXT_IT</a:t>
+            </a:r>
+          </a:p>
+        </p:txBody>
+      </p:sp>
+      <p:sp>
+        <p:nvSpPr>
+          <p:cNvPr id="79" name="ZoneTexte 78">
+            <a:extLst>
+              <a:ext uri="{FF2B5EF4-FFF2-40B4-BE49-F238E27FC236}">
+                <a16:creationId xmlns:a16="http://schemas.microsoft.com/office/drawing/2014/main" id="{334A6D8F-1A64-4548-9F29-60F932160C8B}"/>
+              </a:ext>
+            </a:extLst>
+          </p:cNvPr>
+          <p:cNvSpPr txBox="1"/>
+          <p:nvPr/>
+        </p:nvSpPr>
+        <p:spPr>
+          <a:xfrm>
+            <a:off x="3471061" y="4615788"/>
+            <a:ext cx="1667355" cy="369332"/>
+          </a:xfrm>
+          <a:prstGeom prst="rect">
+            <a:avLst/>
+          </a:prstGeom>
+          <a:noFill/>
+        </p:spPr>
+        <p:txBody>
+          <a:bodyPr wrap="square" rtlCol="0">
+            <a:spAutoFit/>
+          </a:bodyPr>
+          <a:lstStyle/>
+          <a:p>
+            <a:r>
+              <a:rPr lang="fr-FR" dirty="0"/>
+              <a:t>GPIOs EXT_IT</a:t>
+            </a:r>
+          </a:p>
+        </p:txBody>
+      </p:sp>
     </p:spTree>
     <p:extLst>
       <p:ext uri="{BB962C8B-B14F-4D97-AF65-F5344CB8AC3E}">
         <p14:creationId xmlns:p14="http://schemas.microsoft.com/office/powerpoint/2010/main" val="2430766794"/>
+      </p:ext>
+    </p:extLst>
+  </p:cSld>
+  <p:clrMapOvr>
+    <a:masterClrMapping/>
+  </p:clrMapOvr>
+</p:sld>
+</file>
+
+<file path=ppt/slides/slide5.xml><?xml version="1.0" encoding="utf-8"?>
+<p:sld xmlns:a="http://schemas.openxmlformats.org/drawingml/2006/main" xmlns:r="http://schemas.openxmlformats.org/officeDocument/2006/relationships" xmlns:p="http://schemas.openxmlformats.org/presentationml/2006/main">
+  <p:cSld>
+    <p:spTree>
+      <p:nvGrpSpPr>
+        <p:cNvPr id="1" name=""/>
+        <p:cNvGrpSpPr/>
+        <p:nvPr/>
+      </p:nvGrpSpPr>
+      <p:grpSpPr>
+        <a:xfrm>
+          <a:off x="0" y="0"/>
+          <a:ext cx="0" cy="0"/>
+          <a:chOff x="0" y="0"/>
+          <a:chExt cx="0" cy="0"/>
+        </a:xfrm>
+      </p:grpSpPr>
+      <p:sp>
+        <p:nvSpPr>
+          <p:cNvPr id="2" name="Titre 1">
+            <a:extLst>
+              <a:ext uri="{FF2B5EF4-FFF2-40B4-BE49-F238E27FC236}">
+                <a16:creationId xmlns:a16="http://schemas.microsoft.com/office/drawing/2014/main" id="{506B0B54-766D-4F18-AF00-4BD3AB9C12F7}"/>
+              </a:ext>
+            </a:extLst>
+          </p:cNvPr>
+          <p:cNvSpPr>
+            <a:spLocks noGrp="1"/>
+          </p:cNvSpPr>
+          <p:nvPr>
+            <p:ph type="title"/>
+          </p:nvPr>
+        </p:nvSpPr>
+        <p:spPr/>
+        <p:txBody>
+          <a:bodyPr/>
+          <a:lstStyle/>
+          <a:p>
+            <a:r>
+              <a:rPr lang="fr-FR" dirty="0"/>
+              <a:t>AMELIORATIONS ET IDEES</a:t>
+            </a:r>
+          </a:p>
+        </p:txBody>
+      </p:sp>
+      <p:sp>
+        <p:nvSpPr>
+          <p:cNvPr id="3" name="Espace réservé du contenu 2">
+            <a:extLst>
+              <a:ext uri="{FF2B5EF4-FFF2-40B4-BE49-F238E27FC236}">
+                <a16:creationId xmlns:a16="http://schemas.microsoft.com/office/drawing/2014/main" id="{132FAAA8-ECC3-44A3-ADF2-447189FD85C1}"/>
+              </a:ext>
+            </a:extLst>
+          </p:cNvPr>
+          <p:cNvSpPr>
+            <a:spLocks noGrp="1"/>
+          </p:cNvSpPr>
+          <p:nvPr>
+            <p:ph idx="1"/>
+          </p:nvPr>
+        </p:nvSpPr>
+        <p:spPr/>
+        <p:txBody>
+          <a:bodyPr/>
+          <a:lstStyle/>
+          <a:p>
+            <a:r>
+              <a:rPr lang="fr-FR" dirty="0"/>
+              <a:t>Optimisation du code</a:t>
+            </a:r>
+          </a:p>
+          <a:p>
+            <a:r>
+              <a:rPr lang="fr-FR" dirty="0"/>
+              <a:t>Gestion automatique de la vitesse du moteur en fonction de la température</a:t>
+            </a:r>
+          </a:p>
+          <a:p>
+            <a:r>
+              <a:rPr lang="fr-FR" dirty="0"/>
+              <a:t>Gérer les températures négatives (complément à 2)</a:t>
+            </a:r>
+          </a:p>
+          <a:p>
+            <a:r>
+              <a:rPr lang="fr-FR" dirty="0"/>
+              <a:t>Indice de la vitesse du moteur avec les 8 LED</a:t>
+            </a:r>
+          </a:p>
+          <a:p>
+            <a:r>
+              <a:rPr lang="fr-FR" dirty="0"/>
+              <a:t>Etc.</a:t>
+            </a:r>
+          </a:p>
+          <a:p>
+            <a:endParaRPr lang="fr-FR" dirty="0"/>
+          </a:p>
+          <a:p>
+            <a:endParaRPr lang="fr-FR" dirty="0"/>
+          </a:p>
+        </p:txBody>
+      </p:sp>
+    </p:spTree>
+    <p:extLst>
+      <p:ext uri="{BB962C8B-B14F-4D97-AF65-F5344CB8AC3E}">
+        <p14:creationId xmlns:p14="http://schemas.microsoft.com/office/powerpoint/2010/main" val="2985911563"/>
       </p:ext>
     </p:extLst>
   </p:cSld>
@@ -6576,4 +8179,299 @@
     </a:ext>
   </a:extLst>
 </a:theme>
+</file>
+
+<file path=ppt/theme/theme2.xml><?xml version="1.0" encoding="utf-8"?>
+<a:theme xmlns:a="http://schemas.openxmlformats.org/drawingml/2006/main" name="Thème Office">
+  <a:themeElements>
+    <a:clrScheme name="Office">
+      <a:dk1>
+        <a:sysClr val="windowText" lastClr="000000"/>
+      </a:dk1>
+      <a:lt1>
+        <a:sysClr val="window" lastClr="FFFFFF"/>
+      </a:lt1>
+      <a:dk2>
+        <a:srgbClr val="44546A"/>
+      </a:dk2>
+      <a:lt2>
+        <a:srgbClr val="E7E6E6"/>
+      </a:lt2>
+      <a:accent1>
+        <a:srgbClr val="4472C4"/>
+      </a:accent1>
+      <a:accent2>
+        <a:srgbClr val="ED7D31"/>
+      </a:accent2>
+      <a:accent3>
+        <a:srgbClr val="A5A5A5"/>
+      </a:accent3>
+      <a:accent4>
+        <a:srgbClr val="FFC000"/>
+      </a:accent4>
+      <a:accent5>
+        <a:srgbClr val="5B9BD5"/>
+      </a:accent5>
+      <a:accent6>
+        <a:srgbClr val="70AD47"/>
+      </a:accent6>
+      <a:hlink>
+        <a:srgbClr val="0563C1"/>
+      </a:hlink>
+      <a:folHlink>
+        <a:srgbClr val="954F72"/>
+      </a:folHlink>
+    </a:clrScheme>
+    <a:fontScheme name="Office">
+      <a:majorFont>
+        <a:latin typeface="Calibri Light" panose="020F0302020204030204"/>
+        <a:ea typeface=""/>
+        <a:cs typeface=""/>
+        <a:font script="Jpan" typeface="游ゴシック Light"/>
+        <a:font script="Hang" typeface="맑은 고딕"/>
+        <a:font script="Hans" typeface="等线 Light"/>
+        <a:font script="Hant" typeface="新細明體"/>
+        <a:font script="Arab" typeface="Times New Roman"/>
+        <a:font script="Hebr" typeface="Times New Roman"/>
+        <a:font script="Thai" typeface="Angsana New"/>
+        <a:font script="Ethi" typeface="Nyala"/>
+        <a:font script="Beng" typeface="Vrinda"/>
+        <a:font script="Gujr" typeface="Shruti"/>
+        <a:font script="Khmr" typeface="MoolBoran"/>
+        <a:font script="Knda" typeface="Tunga"/>
+        <a:font script="Guru" typeface="Raavi"/>
+        <a:font script="Cans" typeface="Euphemia"/>
+        <a:font script="Cher" typeface="Plantagenet Cherokee"/>
+        <a:font script="Yiii" typeface="Microsoft Yi Baiti"/>
+        <a:font script="Tibt" typeface="Microsoft Himalaya"/>
+        <a:font script="Thaa" typeface="MV Boli"/>
+        <a:font script="Deva" typeface="Mangal"/>
+        <a:font script="Telu" typeface="Gautami"/>
+        <a:font script="Taml" typeface="Latha"/>
+        <a:font script="Syrc" typeface="Estrangelo Edessa"/>
+        <a:font script="Orya" typeface="Kalinga"/>
+        <a:font script="Mlym" typeface="Kartika"/>
+        <a:font script="Laoo" typeface="DokChampa"/>
+        <a:font script="Sinh" typeface="Iskoola Pota"/>
+        <a:font script="Mong" typeface="Mongolian Baiti"/>
+        <a:font script="Viet" typeface="Times New Roman"/>
+        <a:font script="Uigh" typeface="Microsoft Uighur"/>
+        <a:font script="Geor" typeface="Sylfaen"/>
+        <a:font script="Armn" typeface="Arial"/>
+        <a:font script="Bugi" typeface="Leelawadee UI"/>
+        <a:font script="Bopo" typeface="Microsoft JhengHei"/>
+        <a:font script="Java" typeface="Javanese Text"/>
+        <a:font script="Lisu" typeface="Segoe UI"/>
+        <a:font script="Mymr" typeface="Myanmar Text"/>
+        <a:font script="Nkoo" typeface="Ebrima"/>
+        <a:font script="Olck" typeface="Nirmala UI"/>
+        <a:font script="Osma" typeface="Ebrima"/>
+        <a:font script="Phag" typeface="Phagspa"/>
+        <a:font script="Syrn" typeface="Estrangelo Edessa"/>
+        <a:font script="Syrj" typeface="Estrangelo Edessa"/>
+        <a:font script="Syre" typeface="Estrangelo Edessa"/>
+        <a:font script="Sora" typeface="Nirmala UI"/>
+        <a:font script="Tale" typeface="Microsoft Tai Le"/>
+        <a:font script="Talu" typeface="Microsoft New Tai Lue"/>
+        <a:font script="Tfng" typeface="Ebrima"/>
+      </a:majorFont>
+      <a:minorFont>
+        <a:latin typeface="Calibri" panose="020F0502020204030204"/>
+        <a:ea typeface=""/>
+        <a:cs typeface=""/>
+        <a:font script="Jpan" typeface="游ゴシック"/>
+        <a:font script="Hang" typeface="맑은 고딕"/>
+        <a:font script="Hans" typeface="等线"/>
+        <a:font script="Hant" typeface="新細明體"/>
+        <a:font script="Arab" typeface="Arial"/>
+        <a:font script="Hebr" typeface="Arial"/>
+        <a:font script="Thai" typeface="Cordia New"/>
+        <a:font script="Ethi" typeface="Nyala"/>
+        <a:font script="Beng" typeface="Vrinda"/>
+        <a:font script="Gujr" typeface="Shruti"/>
+        <a:font script="Khmr" typeface="DaunPenh"/>
+        <a:font script="Knda" typeface="Tunga"/>
+        <a:font script="Guru" typeface="Raavi"/>
+        <a:font script="Cans" typeface="Euphemia"/>
+        <a:font script="Cher" typeface="Plantagenet Cherokee"/>
+        <a:font script="Yiii" typeface="Microsoft Yi Baiti"/>
+        <a:font script="Tibt" typeface="Microsoft Himalaya"/>
+        <a:font script="Thaa" typeface="MV Boli"/>
+        <a:font script="Deva" typeface="Mangal"/>
+        <a:font script="Telu" typeface="Gautami"/>
+        <a:font script="Taml" typeface="Latha"/>
+        <a:font script="Syrc" typeface="Estrangelo Edessa"/>
+        <a:font script="Orya" typeface="Kalinga"/>
+        <a:font script="Mlym" typeface="Kartika"/>
+        <a:font script="Laoo" typeface="DokChampa"/>
+        <a:font script="Sinh" typeface="Iskoola Pota"/>
+        <a:font script="Mong" typeface="Mongolian Baiti"/>
+        <a:font script="Viet" typeface="Arial"/>
+        <a:font script="Uigh" typeface="Microsoft Uighur"/>
+        <a:font script="Geor" typeface="Sylfaen"/>
+        <a:font script="Armn" typeface="Arial"/>
+        <a:font script="Bugi" typeface="Leelawadee UI"/>
+        <a:font script="Bopo" typeface="Microsoft JhengHei"/>
+        <a:font script="Java" typeface="Javanese Text"/>
+        <a:font script="Lisu" typeface="Segoe UI"/>
+        <a:font script="Mymr" typeface="Myanmar Text"/>
+        <a:font script="Nkoo" typeface="Ebrima"/>
+        <a:font script="Olck" typeface="Nirmala UI"/>
+        <a:font script="Osma" typeface="Ebrima"/>
+        <a:font script="Phag" typeface="Phagspa"/>
+        <a:font script="Syrn" typeface="Estrangelo Edessa"/>
+        <a:font script="Syrj" typeface="Estrangelo Edessa"/>
+        <a:font script="Syre" typeface="Estrangelo Edessa"/>
+        <a:font script="Sora" typeface="Nirmala UI"/>
+        <a:font script="Tale" typeface="Microsoft Tai Le"/>
+        <a:font script="Talu" typeface="Microsoft New Tai Lue"/>
+        <a:font script="Tfng" typeface="Ebrima"/>
+      </a:minorFont>
+    </a:fontScheme>
+    <a:fmtScheme name="Office">
+      <a:fillStyleLst>
+        <a:solidFill>
+          <a:schemeClr val="phClr"/>
+        </a:solidFill>
+        <a:gradFill rotWithShape="1">
+          <a:gsLst>
+            <a:gs pos="0">
+              <a:schemeClr val="phClr">
+                <a:lumMod val="110000"/>
+                <a:satMod val="105000"/>
+                <a:tint val="67000"/>
+              </a:schemeClr>
+            </a:gs>
+            <a:gs pos="50000">
+              <a:schemeClr val="phClr">
+                <a:lumMod val="105000"/>
+                <a:satMod val="103000"/>
+                <a:tint val="73000"/>
+              </a:schemeClr>
+            </a:gs>
+            <a:gs pos="100000">
+              <a:schemeClr val="phClr">
+                <a:lumMod val="105000"/>
+                <a:satMod val="109000"/>
+                <a:tint val="81000"/>
+              </a:schemeClr>
+            </a:gs>
+          </a:gsLst>
+          <a:lin ang="5400000" scaled="0"/>
+        </a:gradFill>
+        <a:gradFill rotWithShape="1">
+          <a:gsLst>
+            <a:gs pos="0">
+              <a:schemeClr val="phClr">
+                <a:satMod val="103000"/>
+                <a:lumMod val="102000"/>
+                <a:tint val="94000"/>
+              </a:schemeClr>
+            </a:gs>
+            <a:gs pos="50000">
+              <a:schemeClr val="phClr">
+                <a:satMod val="110000"/>
+                <a:lumMod val="100000"/>
+                <a:shade val="100000"/>
+              </a:schemeClr>
+            </a:gs>
+            <a:gs pos="100000">
+              <a:schemeClr val="phClr">
+                <a:lumMod val="99000"/>
+                <a:satMod val="120000"/>
+                <a:shade val="78000"/>
+              </a:schemeClr>
+            </a:gs>
+          </a:gsLst>
+          <a:lin ang="5400000" scaled="0"/>
+        </a:gradFill>
+      </a:fillStyleLst>
+      <a:lnStyleLst>
+        <a:ln w="6350" cap="flat" cmpd="sng" algn="ctr">
+          <a:solidFill>
+            <a:schemeClr val="phClr"/>
+          </a:solidFill>
+          <a:prstDash val="solid"/>
+          <a:miter lim="800000"/>
+        </a:ln>
+        <a:ln w="12700" cap="flat" cmpd="sng" algn="ctr">
+          <a:solidFill>
+            <a:schemeClr val="phClr"/>
+          </a:solidFill>
+          <a:prstDash val="solid"/>
+          <a:miter lim="800000"/>
+        </a:ln>
+        <a:ln w="19050" cap="flat" cmpd="sng" algn="ctr">
+          <a:solidFill>
+            <a:schemeClr val="phClr"/>
+          </a:solidFill>
+          <a:prstDash val="solid"/>
+          <a:miter lim="800000"/>
+        </a:ln>
+      </a:lnStyleLst>
+      <a:effectStyleLst>
+        <a:effectStyle>
+          <a:effectLst/>
+        </a:effectStyle>
+        <a:effectStyle>
+          <a:effectLst/>
+        </a:effectStyle>
+        <a:effectStyle>
+          <a:effectLst>
+            <a:outerShdw blurRad="57150" dist="19050" dir="5400000" algn="ctr" rotWithShape="0">
+              <a:srgbClr val="000000">
+                <a:alpha val="63000"/>
+              </a:srgbClr>
+            </a:outerShdw>
+          </a:effectLst>
+        </a:effectStyle>
+      </a:effectStyleLst>
+      <a:bgFillStyleLst>
+        <a:solidFill>
+          <a:schemeClr val="phClr"/>
+        </a:solidFill>
+        <a:solidFill>
+          <a:schemeClr val="phClr">
+            <a:tint val="95000"/>
+            <a:satMod val="170000"/>
+          </a:schemeClr>
+        </a:solidFill>
+        <a:gradFill rotWithShape="1">
+          <a:gsLst>
+            <a:gs pos="0">
+              <a:schemeClr val="phClr">
+                <a:tint val="93000"/>
+                <a:satMod val="150000"/>
+                <a:shade val="98000"/>
+                <a:lumMod val="102000"/>
+              </a:schemeClr>
+            </a:gs>
+            <a:gs pos="50000">
+              <a:schemeClr val="phClr">
+                <a:tint val="98000"/>
+                <a:satMod val="130000"/>
+                <a:shade val="90000"/>
+                <a:lumMod val="103000"/>
+              </a:schemeClr>
+            </a:gs>
+            <a:gs pos="100000">
+              <a:schemeClr val="phClr">
+                <a:shade val="63000"/>
+                <a:satMod val="120000"/>
+              </a:schemeClr>
+            </a:gs>
+          </a:gsLst>
+          <a:lin ang="5400000" scaled="0"/>
+        </a:gradFill>
+      </a:bgFillStyleLst>
+    </a:fmtScheme>
+  </a:themeElements>
+  <a:objectDefaults/>
+  <a:extraClrSchemeLst/>
+  <a:extLst>
+    <a:ext uri="{05A4C25C-085E-4340-85A3-A5531E510DB2}">
+      <thm15:themeFamily xmlns:thm15="http://schemas.microsoft.com/office/thememl/2012/main" name="Office Theme" id="{62F939B6-93AF-4DB8-9C6B-D6C7DFDC589F}" vid="{4A3C46E8-61CC-4603-A589-7422A47A8E4A}"/>
+    </a:ext>
+  </a:extLst>
+</a:theme>
 </file>
</xml_diff>

<commit_message>
End of slides and update
If we are in the ALARME mode we can not change the speed of the engine (it is set automatically) but we can force the full speed if there is a problem. under commenting
</commit_message>
<xml_diff>
--- a/Presentation/ProjetSTM32.pptx
+++ b/Presentation/ProjetSTM32.pptx
@@ -5910,6 +5910,45 @@
           </a:p>
         </p:txBody>
       </p:sp>
+      <p:pic>
+        <p:nvPicPr>
+          <p:cNvPr id="6" name="887cba8a-f799-4d8e-ada8-daf4a6b8948b" descr="Image">
+            <a:extLst>
+              <a:ext uri="{FF2B5EF4-FFF2-40B4-BE49-F238E27FC236}">
+                <a16:creationId xmlns:a16="http://schemas.microsoft.com/office/drawing/2014/main" id="{DBDE4B39-9AA1-4011-B95D-6E49B668D87A}"/>
+              </a:ext>
+            </a:extLst>
+          </p:cNvPr>
+          <p:cNvPicPr/>
+          <p:nvPr/>
+        </p:nvPicPr>
+        <p:blipFill>
+          <a:blip r:embed="rId2">
+            <a:extLst>
+              <a:ext uri="{28A0092B-C50C-407E-A947-70E740481C1C}">
+                <a14:useLocalDpi xmlns:a14="http://schemas.microsoft.com/office/drawing/2010/main" val="0"/>
+              </a:ext>
+            </a:extLst>
+          </a:blip>
+          <a:srcRect/>
+          <a:stretch>
+            <a:fillRect/>
+          </a:stretch>
+        </p:blipFill>
+        <p:spPr bwMode="auto">
+          <a:xfrm>
+            <a:off x="8638389" y="141343"/>
+            <a:ext cx="3358950" cy="2429734"/>
+          </a:xfrm>
+          <a:prstGeom prst="rect">
+            <a:avLst/>
+          </a:prstGeom>
+          <a:noFill/>
+          <a:ln>
+            <a:noFill/>
+          </a:ln>
+        </p:spPr>
+      </p:pic>
     </p:spTree>
     <p:extLst>
       <p:ext uri="{BB962C8B-B14F-4D97-AF65-F5344CB8AC3E}">

</xml_diff>

<commit_message>
Change end presentation and bug repair, can be presented
Add the autonomus engine pulse
</commit_message>
<xml_diff>
--- a/Presentation/ProjetSTM32.pptx
+++ b/Presentation/ProjetSTM32.pptx
@@ -654,7 +654,7 @@
           <a:effectLst/>
           <a:extLst>
             <a:ext uri="{91240B29-F687-4f45-9708-019B960494DF}">
-              <a14:hiddenLine xmlns="" xmlns:a14="http://schemas.microsoft.com/office/drawing/2010/main" w="9525">
+              <a14:hiddenLine xmlns:a14="http://schemas.microsoft.com/office/drawing/2010/main" xmlns="" w="9525">
                 <a:solidFill>
                   <a:srgbClr val="000000"/>
                 </a:solidFill>
@@ -2182,7 +2182,7 @@
           <a:ln/>
           <a:extLst>
             <a:ext uri="{91240B29-F687-4f45-9708-019B960494DF}">
-              <a14:hiddenLine xmlns="" xmlns:a14="http://schemas.microsoft.com/office/drawing/2010/main" w="9525">
+              <a14:hiddenLine xmlns:a14="http://schemas.microsoft.com/office/drawing/2010/main" xmlns="" w="9525">
                 <a:solidFill>
                   <a:srgbClr val="000000"/>
                 </a:solidFill>
@@ -2457,7 +2457,7 @@
           <a:ln/>
           <a:extLst>
             <a:ext uri="{91240B29-F687-4f45-9708-019B960494DF}">
-              <a14:hiddenLine xmlns="" xmlns:a14="http://schemas.microsoft.com/office/drawing/2010/main" w="9525">
+              <a14:hiddenLine xmlns:a14="http://schemas.microsoft.com/office/drawing/2010/main" xmlns="" w="9525">
                 <a:solidFill>
                   <a:srgbClr val="000000"/>
                 </a:solidFill>
@@ -2740,7 +2740,7 @@
           <a:ln/>
           <a:extLst>
             <a:ext uri="{91240B29-F687-4f45-9708-019B960494DF}">
-              <a14:hiddenLine xmlns="" xmlns:a14="http://schemas.microsoft.com/office/drawing/2010/main" w="9525">
+              <a14:hiddenLine xmlns:a14="http://schemas.microsoft.com/office/drawing/2010/main" xmlns="" w="9525">
                 <a:solidFill>
                   <a:srgbClr val="000000"/>
                 </a:solidFill>
@@ -3366,7 +3366,7 @@
           <a:ln/>
           <a:extLst>
             <a:ext uri="{91240B29-F687-4f45-9708-019B960494DF}">
-              <a14:hiddenLine xmlns="" xmlns:a14="http://schemas.microsoft.com/office/drawing/2010/main" w="9525">
+              <a14:hiddenLine xmlns:a14="http://schemas.microsoft.com/office/drawing/2010/main" xmlns="" w="9525">
                 <a:solidFill>
                   <a:srgbClr val="000000"/>
                 </a:solidFill>
@@ -3705,7 +3705,7 @@
           <a:ln/>
           <a:extLst>
             <a:ext uri="{91240B29-F687-4f45-9708-019B960494DF}">
-              <a14:hiddenLine xmlns="" xmlns:a14="http://schemas.microsoft.com/office/drawing/2010/main" w="9525">
+              <a14:hiddenLine xmlns:a14="http://schemas.microsoft.com/office/drawing/2010/main" xmlns="" w="9525">
                 <a:solidFill>
                   <a:srgbClr val="000000"/>
                 </a:solidFill>
@@ -4182,7 +4182,7 @@
           <a:ln/>
           <a:extLst>
             <a:ext uri="{91240B29-F687-4f45-9708-019B960494DF}">
-              <a14:hiddenLine xmlns="" xmlns:a14="http://schemas.microsoft.com/office/drawing/2010/main" w="9525">
+              <a14:hiddenLine xmlns:a14="http://schemas.microsoft.com/office/drawing/2010/main" xmlns="" w="9525">
                 <a:solidFill>
                   <a:srgbClr val="000000"/>
                 </a:solidFill>
@@ -4611,7 +4611,7 @@
           <a:ln/>
           <a:extLst>
             <a:ext uri="{91240B29-F687-4f45-9708-019B960494DF}">
-              <a14:hiddenLine xmlns="" xmlns:a14="http://schemas.microsoft.com/office/drawing/2010/main" w="9525">
+              <a14:hiddenLine xmlns:a14="http://schemas.microsoft.com/office/drawing/2010/main" xmlns="" w="9525">
                 <a:solidFill>
                   <a:srgbClr val="000000"/>
                 </a:solidFill>
@@ -7936,12 +7936,6 @@
             <a:r>
               <a:rPr lang="fr-FR" dirty="0"/>
               <a:t>Optimisation du code</a:t>
-            </a:r>
-          </a:p>
-          <a:p>
-            <a:r>
-              <a:rPr lang="fr-FR" dirty="0"/>
-              <a:t>Gestion automatique de la vitesse du moteur en fonction de la température</a:t>
             </a:r>
           </a:p>
           <a:p>

</xml_diff>